<commit_message>
Update ArchitectureDesignPatterns_00.pptx with new content
</commit_message>
<xml_diff>
--- a/Documentação/PPTs/ArchitectureDesignPatterns_00.pptx
+++ b/Documentação/PPTs/ArchitectureDesignPatterns_00.pptx
@@ -2849,14 +2849,18 @@
         <a:lstStyle/>
         <a:p>
           <a:r>
-            <a:rPr lang="en-US"/>
-            <a:t>Agap2It worked hardly to bring you a world-class learning experience</a:t>
+            <a:rPr lang="en-US" dirty="0" err="1"/>
+            <a:t>Moongy</a:t>
           </a:r>
           <a:r>
-            <a:rPr lang="pt-PT" b="1" i="1"/>
+            <a:rPr lang="en-US" dirty="0"/>
+            <a:t> worked hardly to bring you a world-class learning experience</a:t>
+          </a:r>
+          <a:r>
+            <a:rPr lang="pt-PT" b="1" i="1" dirty="0"/>
             <a:t>. </a:t>
           </a:r>
-          <a:endParaRPr lang="en-US"/>
+          <a:endParaRPr lang="en-US" dirty="0"/>
         </a:p>
       </dgm:t>
     </dgm:pt>
@@ -3874,8 +3878,8 @@
       </dsp:nvSpPr>
       <dsp:spPr>
         <a:xfrm>
-          <a:off x="427635" y="408099"/>
-          <a:ext cx="695302" cy="695302"/>
+          <a:off x="483010" y="1003379"/>
+          <a:ext cx="787060" cy="787060"/>
         </a:xfrm>
         <a:prstGeom prst="rect">
           <a:avLst/>
@@ -3924,8 +3928,8 @@
       </dsp:nvSpPr>
       <dsp:spPr>
         <a:xfrm>
-          <a:off x="2728" y="1364482"/>
-          <a:ext cx="1545117" cy="618046"/>
+          <a:off x="2028" y="2052991"/>
+          <a:ext cx="1749023" cy="699609"/>
         </a:xfrm>
         <a:prstGeom prst="rect">
           <a:avLst/>
@@ -3954,7 +3958,7 @@
         </a:bodyPr>
         <a:lstStyle/>
         <a:p>
-          <a:pPr marL="0" lvl="0" indent="0" algn="ctr" defTabSz="488950">
+          <a:pPr marL="0" lvl="0" indent="0" algn="ctr" defTabSz="533400">
             <a:lnSpc>
               <a:spcPct val="90000"/>
             </a:lnSpc>
@@ -3967,15 +3971,15 @@
             <a:buNone/>
           </a:pPr>
           <a:r>
-            <a:rPr lang="en-US" sz="1100" b="1" kern="1200"/>
+            <a:rPr lang="en-US" sz="1200" b="1" kern="1200"/>
             <a:t>Thank you for joining us today</a:t>
           </a:r>
-          <a:endParaRPr lang="en-US" sz="1100" kern="1200"/>
+          <a:endParaRPr lang="en-US" sz="1200" kern="1200"/>
         </a:p>
       </dsp:txBody>
       <dsp:txXfrm>
-        <a:off x="2728" y="1364482"/>
-        <a:ext cx="1545117" cy="618046"/>
+        <a:off x="2028" y="2052991"/>
+        <a:ext cx="1749023" cy="699609"/>
       </dsp:txXfrm>
     </dsp:sp>
     <dsp:sp modelId="{7278CCC7-773B-48DF-9B6E-5DA24A131108}">
@@ -3985,8 +3989,8 @@
       </dsp:nvSpPr>
       <dsp:spPr>
         <a:xfrm>
-          <a:off x="2243148" y="408099"/>
-          <a:ext cx="695302" cy="695302"/>
+          <a:off x="2538112" y="1003379"/>
+          <a:ext cx="787060" cy="787060"/>
         </a:xfrm>
         <a:prstGeom prst="rect">
           <a:avLst/>
@@ -4035,8 +4039,8 @@
       </dsp:nvSpPr>
       <dsp:spPr>
         <a:xfrm>
-          <a:off x="1818241" y="1364482"/>
-          <a:ext cx="1545117" cy="618046"/>
+          <a:off x="2057131" y="2052991"/>
+          <a:ext cx="1749023" cy="699609"/>
         </a:xfrm>
         <a:prstGeom prst="rect">
           <a:avLst/>
@@ -4065,7 +4069,7 @@
         </a:bodyPr>
         <a:lstStyle/>
         <a:p>
-          <a:pPr marL="0" lvl="0" indent="0" algn="ctr" defTabSz="488950">
+          <a:pPr marL="0" lvl="0" indent="0" algn="ctr" defTabSz="533400">
             <a:lnSpc>
               <a:spcPct val="90000"/>
             </a:lnSpc>
@@ -4078,19 +4082,23 @@
             <a:buNone/>
           </a:pPr>
           <a:r>
-            <a:rPr lang="en-US" sz="1100" kern="1200"/>
-            <a:t>Agap2It worked hardly to bring you a world-class learning experience</a:t>
+            <a:rPr lang="en-US" sz="1200" kern="1200" dirty="0" err="1"/>
+            <a:t>Moongy</a:t>
           </a:r>
           <a:r>
-            <a:rPr lang="pt-PT" sz="1100" b="1" i="1" kern="1200"/>
+            <a:rPr lang="en-US" sz="1200" kern="1200" dirty="0"/>
+            <a:t> worked hardly to bring you a world-class learning experience</a:t>
+          </a:r>
+          <a:r>
+            <a:rPr lang="pt-PT" sz="1200" b="1" i="1" kern="1200" dirty="0"/>
             <a:t>. </a:t>
           </a:r>
-          <a:endParaRPr lang="en-US" sz="1100" kern="1200"/>
+          <a:endParaRPr lang="en-US" sz="1200" kern="1200" dirty="0"/>
         </a:p>
       </dsp:txBody>
       <dsp:txXfrm>
-        <a:off x="1818241" y="1364482"/>
-        <a:ext cx="1545117" cy="618046"/>
+        <a:off x="2057131" y="2052991"/>
+        <a:ext cx="1749023" cy="699609"/>
       </dsp:txXfrm>
     </dsp:sp>
     <dsp:sp modelId="{84BEAA06-CEDF-4E09-BDA7-CE2FCB8DBA5F}">
@@ -4100,8 +4108,8 @@
       </dsp:nvSpPr>
       <dsp:spPr>
         <a:xfrm>
-          <a:off x="4058661" y="408099"/>
-          <a:ext cx="695302" cy="695302"/>
+          <a:off x="4593215" y="1003379"/>
+          <a:ext cx="787060" cy="787060"/>
         </a:xfrm>
         <a:prstGeom prst="rect">
           <a:avLst/>
@@ -4150,8 +4158,8 @@
       </dsp:nvSpPr>
       <dsp:spPr>
         <a:xfrm>
-          <a:off x="3633754" y="1364482"/>
-          <a:ext cx="1545117" cy="618046"/>
+          <a:off x="4112233" y="2052991"/>
+          <a:ext cx="1749023" cy="699609"/>
         </a:xfrm>
         <a:prstGeom prst="rect">
           <a:avLst/>
@@ -4180,7 +4188,7 @@
         </a:bodyPr>
         <a:lstStyle/>
         <a:p>
-          <a:pPr marL="0" lvl="0" indent="0" algn="ctr" defTabSz="488950">
+          <a:pPr marL="0" lvl="0" indent="0" algn="ctr" defTabSz="533400">
             <a:lnSpc>
               <a:spcPct val="90000"/>
             </a:lnSpc>
@@ -4193,15 +4201,15 @@
             <a:buNone/>
           </a:pPr>
           <a:r>
-            <a:rPr lang="en-US" sz="1100" b="1" kern="1200"/>
+            <a:rPr lang="en-US" sz="1200" b="1" kern="1200"/>
             <a:t>Microsoft Certified Trainers + Instructors.</a:t>
           </a:r>
-          <a:endParaRPr lang="en-US" sz="1100" kern="1200"/>
+          <a:endParaRPr lang="en-US" sz="1200" kern="1200"/>
         </a:p>
       </dsp:txBody>
       <dsp:txXfrm>
-        <a:off x="3633754" y="1364482"/>
-        <a:ext cx="1545117" cy="618046"/>
+        <a:off x="4112233" y="2052991"/>
+        <a:ext cx="1749023" cy="699609"/>
       </dsp:txXfrm>
     </dsp:sp>
     <dsp:sp modelId="{75DFD435-D5B8-4CBC-9398-1E6D12750E2E}">
@@ -4211,8 +4219,8 @@
       </dsp:nvSpPr>
       <dsp:spPr>
         <a:xfrm>
-          <a:off x="1335392" y="2368808"/>
-          <a:ext cx="695302" cy="695302"/>
+          <a:off x="6648317" y="1003379"/>
+          <a:ext cx="787060" cy="787060"/>
         </a:xfrm>
         <a:prstGeom prst="rect">
           <a:avLst/>
@@ -4261,8 +4269,8 @@
       </dsp:nvSpPr>
       <dsp:spPr>
         <a:xfrm>
-          <a:off x="910485" y="3325191"/>
-          <a:ext cx="1545117" cy="618046"/>
+          <a:off x="6167336" y="2052991"/>
+          <a:ext cx="1749023" cy="699609"/>
         </a:xfrm>
         <a:prstGeom prst="rect">
           <a:avLst/>
@@ -4291,7 +4299,7 @@
         </a:bodyPr>
         <a:lstStyle/>
         <a:p>
-          <a:pPr marL="0" lvl="0" indent="0" algn="ctr" defTabSz="488950">
+          <a:pPr marL="0" lvl="0" indent="0" algn="ctr" defTabSz="533400">
             <a:lnSpc>
               <a:spcPct val="90000"/>
             </a:lnSpc>
@@ -4304,14 +4312,14 @@
             <a:buNone/>
           </a:pPr>
           <a:r>
-            <a:rPr lang="en-US" sz="1100" kern="1200"/>
+            <a:rPr lang="en-US" sz="1200" kern="1200"/>
             <a:t>Your instructor is a premier technical and instructional expert who meets ongoing certification requirements.</a:t>
           </a:r>
         </a:p>
       </dsp:txBody>
       <dsp:txXfrm>
-        <a:off x="910485" y="3325191"/>
-        <a:ext cx="1545117" cy="618046"/>
+        <a:off x="6167336" y="2052991"/>
+        <a:ext cx="1749023" cy="699609"/>
       </dsp:txXfrm>
     </dsp:sp>
     <dsp:sp modelId="{9C09C123-989A-45A2-BDF2-3C151DFD4B8D}">
@@ -4321,8 +4329,8 @@
       </dsp:nvSpPr>
       <dsp:spPr>
         <a:xfrm>
-          <a:off x="3150904" y="2368808"/>
-          <a:ext cx="695302" cy="695302"/>
+          <a:off x="8703420" y="1003379"/>
+          <a:ext cx="787060" cy="787060"/>
         </a:xfrm>
         <a:prstGeom prst="rect">
           <a:avLst/>
@@ -4371,8 +4379,8 @@
       </dsp:nvSpPr>
       <dsp:spPr>
         <a:xfrm>
-          <a:off x="2725997" y="3325191"/>
-          <a:ext cx="1545117" cy="618046"/>
+          <a:off x="8222438" y="2052991"/>
+          <a:ext cx="1749023" cy="699609"/>
         </a:xfrm>
         <a:prstGeom prst="rect">
           <a:avLst/>
@@ -4401,7 +4409,7 @@
         </a:bodyPr>
         <a:lstStyle/>
         <a:p>
-          <a:pPr marL="0" lvl="0" indent="0" algn="ctr" defTabSz="488950">
+          <a:pPr marL="0" lvl="0" indent="0" algn="ctr" defTabSz="533400">
             <a:lnSpc>
               <a:spcPct val="90000"/>
             </a:lnSpc>
@@ -4414,14 +4422,14 @@
             <a:buNone/>
           </a:pPr>
           <a:r>
-            <a:rPr lang="en-US" sz="1100" kern="1200"/>
+            <a:rPr lang="en-US" sz="1200" kern="1200"/>
             <a:t>We wish you a great learning experience and ongoing career success!</a:t>
           </a:r>
         </a:p>
       </dsp:txBody>
       <dsp:txXfrm>
-        <a:off x="2725997" y="3325191"/>
-        <a:ext cx="1545117" cy="618046"/>
+        <a:off x="8222438" y="2052991"/>
+        <a:ext cx="1749023" cy="699609"/>
       </dsp:txXfrm>
     </dsp:sp>
   </dsp:spTree>
@@ -13657,14 +13665,14 @@
             <p:ph sz="half" idx="2"/>
             <p:extLst>
               <p:ext uri="{D42A27DB-BD31-4B8C-83A1-F6EECF244321}">
-                <p14:modId xmlns:p14="http://schemas.microsoft.com/office/powerpoint/2010/main" val="4214447704"/>
+                <p14:modId xmlns:p14="http://schemas.microsoft.com/office/powerpoint/2010/main" val="3733314958"/>
               </p:ext>
             </p:extLst>
           </p:nvPr>
         </p:nvGraphicFramePr>
         <p:xfrm>
-          <a:off x="6172200" y="1825625"/>
-          <a:ext cx="5181600" cy="4351338"/>
+          <a:off x="1109254" y="2420983"/>
+          <a:ext cx="9973491" cy="3755980"/>
         </p:xfrm>
         <a:graphic>
           <a:graphicData uri="http://schemas.openxmlformats.org/drawingml/2006/diagram">
@@ -13834,7 +13842,7 @@
         <p:spPr/>
         <p:txBody>
           <a:bodyPr>
-            <a:normAutofit fontScale="92500" lnSpcReduction="10000"/>
+            <a:normAutofit fontScale="92500" lnSpcReduction="20000"/>
           </a:bodyPr>
           <a:lstStyle/>
           <a:p>
@@ -13912,6 +13920,36 @@
               <a:buChar char="•"/>
             </a:pPr>
             <a:r>
+              <a:rPr lang="pt-BR" sz="1800" dirty="0" err="1"/>
+              <a:t>Moongy</a:t>
+            </a:r>
+            <a:r>
+              <a:rPr lang="pt-BR" sz="1800" dirty="0"/>
+              <a:t> </a:t>
+            </a:r>
+            <a:r>
+              <a:rPr lang="pt-BR" sz="1800" dirty="0" err="1"/>
+              <a:t>Partner</a:t>
+            </a:r>
+            <a:r>
+              <a:rPr lang="pt-BR" sz="1800" dirty="0"/>
+              <a:t> </a:t>
+            </a:r>
+            <a:r>
+              <a:rPr lang="pt-BR" sz="1800" dirty="0" err="1"/>
+              <a:t>since</a:t>
+            </a:r>
+            <a:r>
+              <a:rPr lang="pt-BR" sz="1800" dirty="0"/>
+              <a:t> 2020</a:t>
+            </a:r>
+          </a:p>
+          <a:p>
+            <a:pPr marL="342900" indent="-342900">
+              <a:buFont typeface="Arial" panose="020B0604020202020204" pitchFamily="34" charset="0"/>
+              <a:buChar char="•"/>
+            </a:pPr>
+            <a:r>
               <a:rPr lang="pt-BR" sz="1800" dirty="0"/>
               <a:t>Microsoft </a:t>
             </a:r>
@@ -13921,15 +13959,7 @@
             </a:r>
             <a:r>
               <a:rPr lang="pt-BR" sz="1800" dirty="0"/>
-              <a:t> </a:t>
-            </a:r>
-            <a:r>
-              <a:rPr lang="pt-BR" sz="1800" dirty="0" err="1"/>
-              <a:t>Trainer</a:t>
-            </a:r>
-            <a:r>
-              <a:rPr lang="pt-BR" sz="1800" dirty="0"/>
-              <a:t> </a:t>
+              <a:t> Trainer </a:t>
             </a:r>
             <a:r>
               <a:rPr lang="pt-BR" sz="1800" dirty="0" err="1"/>
@@ -14547,7 +14577,7 @@
             </a:pPr>
             <a:r>
               <a:rPr lang="en-US" sz="2400" dirty="0"/>
-              <a:t>Development experience in .NET Framework and with Domain Driven Design</a:t>
+              <a:t>Development experience in .NET Framework and with Design Patterns</a:t>
             </a:r>
           </a:p>
           <a:p>
@@ -15650,6 +15680,53 @@
           </a:prstGeom>
         </p:spPr>
       </p:pic>
+      <p:pic>
+        <p:nvPicPr>
+          <p:cNvPr id="3074" name="Picture 2" descr="Vale Tudo - Série 2025 - AdoroCinema">
+            <a:extLst>
+              <a:ext uri="{FF2B5EF4-FFF2-40B4-BE49-F238E27FC236}">
+                <a16:creationId xmlns:a16="http://schemas.microsoft.com/office/drawing/2014/main" id="{FC341F7F-0251-CDB2-409D-D1381B1CA62A}"/>
+              </a:ext>
+            </a:extLst>
+          </p:cNvPr>
+          <p:cNvPicPr>
+            <a:picLocks noChangeAspect="1" noChangeArrowheads="1"/>
+          </p:cNvPicPr>
+          <p:nvPr/>
+        </p:nvPicPr>
+        <p:blipFill>
+          <a:blip r:embed="rId6">
+            <a:extLst>
+              <a:ext uri="{28A0092B-C50C-407E-A947-70E740481C1C}">
+                <a14:useLocalDpi xmlns:a14="http://schemas.microsoft.com/office/drawing/2010/main" val="0"/>
+              </a:ext>
+            </a:extLst>
+          </a:blip>
+          <a:srcRect/>
+          <a:stretch>
+            <a:fillRect/>
+          </a:stretch>
+        </p:blipFill>
+        <p:spPr bwMode="auto">
+          <a:xfrm>
+            <a:off x="7590497" y="4707795"/>
+            <a:ext cx="1425697" cy="1931590"/>
+          </a:xfrm>
+          <a:prstGeom prst="rect">
+            <a:avLst/>
+          </a:prstGeom>
+          <a:noFill/>
+          <a:extLst>
+            <a:ext uri="{909E8E84-426E-40DD-AFC4-6F175D3DCCD1}">
+              <a14:hiddenFill xmlns:a14="http://schemas.microsoft.com/office/drawing/2010/main">
+                <a:solidFill>
+                  <a:srgbClr val="FFFFFF"/>
+                </a:solidFill>
+              </a14:hiddenFill>
+            </a:ext>
+          </a:extLst>
+        </p:spPr>
+      </p:pic>
     </p:spTree>
     <p:extLst>
       <p:ext uri="{BB962C8B-B14F-4D97-AF65-F5344CB8AC3E}">
@@ -16078,63 +16155,6 @@
       </p:grpSpPr>
       <p:sp>
         <p:nvSpPr>
-          <p:cNvPr id="5" name="Símbolo de &quot;Não Permitido&quot; 4">
-            <a:extLst>
-              <a:ext uri="{FF2B5EF4-FFF2-40B4-BE49-F238E27FC236}">
-                <a16:creationId xmlns:a16="http://schemas.microsoft.com/office/drawing/2014/main" id="{D15571BD-EA0A-70E8-2D2D-368C032A43B2}"/>
-              </a:ext>
-            </a:extLst>
-          </p:cNvPr>
-          <p:cNvSpPr/>
-          <p:nvPr/>
-        </p:nvSpPr>
-        <p:spPr>
-          <a:xfrm>
-            <a:off x="2225040" y="966652"/>
-            <a:ext cx="7436154" cy="5830388"/>
-          </a:xfrm>
-          <a:prstGeom prst="noSmoking">
-            <a:avLst/>
-          </a:prstGeom>
-          <a:effectLst>
-            <a:outerShdw blurRad="50800" dist="38100" dir="2700000" algn="tl" rotWithShape="0">
-              <a:prstClr val="black">
-                <a:alpha val="40000"/>
-              </a:prstClr>
-            </a:outerShdw>
-          </a:effectLst>
-        </p:spPr>
-        <p:style>
-          <a:lnRef idx="2">
-            <a:schemeClr val="accent2">
-              <a:shade val="15000"/>
-            </a:schemeClr>
-          </a:lnRef>
-          <a:fillRef idx="1">
-            <a:schemeClr val="accent2"/>
-          </a:fillRef>
-          <a:effectRef idx="0">
-            <a:schemeClr val="accent2"/>
-          </a:effectRef>
-          <a:fontRef idx="minor">
-            <a:schemeClr val="lt1"/>
-          </a:fontRef>
-        </p:style>
-        <p:txBody>
-          <a:bodyPr rtlCol="0" anchor="ctr"/>
-          <a:lstStyle/>
-          <a:p>
-            <a:pPr algn="ctr"/>
-            <a:endParaRPr lang="pt-BR">
-              <a:solidFill>
-                <a:schemeClr val="tx1"/>
-              </a:solidFill>
-            </a:endParaRPr>
-          </a:p>
-        </p:txBody>
-      </p:sp>
-      <p:sp>
-        <p:nvSpPr>
           <p:cNvPr id="2" name="Marcador de Posição do Número do Diapositivo 1">
             <a:extLst>
               <a:ext uri="{FF2B5EF4-FFF2-40B4-BE49-F238E27FC236}">
@@ -16262,10 +16282,15 @@
             <p:ph sz="half" idx="13"/>
           </p:nvPr>
         </p:nvSpPr>
-        <p:spPr/>
+        <p:spPr>
+          <a:xfrm>
+            <a:off x="838200" y="1825625"/>
+            <a:ext cx="4478383" cy="1858101"/>
+          </a:xfrm>
+        </p:spPr>
         <p:txBody>
           <a:bodyPr>
-            <a:normAutofit/>
+            <a:normAutofit fontScale="62500" lnSpcReduction="20000"/>
           </a:bodyPr>
           <a:lstStyle/>
           <a:p>
@@ -16281,7 +16306,7 @@
               <a:buChar char="•"/>
             </a:pPr>
             <a:r>
-              <a:rPr lang="en-US" sz="2400" dirty="0"/>
+              <a:rPr lang="en-US" sz="1800" strike="sngStrike" dirty="0"/>
               <a:t>Understand that software development is an iterative process.</a:t>
             </a:r>
           </a:p>
@@ -16291,10 +16316,10 @@
               <a:buChar char="•"/>
             </a:pPr>
             <a:r>
-              <a:rPr lang="en-US" sz="2400" dirty="0"/>
+              <a:rPr lang="en-US" sz="1800" strike="sngStrike" dirty="0"/>
               <a:t>Recognize the interdependence between developers and business/domain specialists.</a:t>
             </a:r>
-            <a:endParaRPr lang="pt-BR" sz="2400" dirty="0"/>
+            <a:endParaRPr lang="pt-BR" sz="1800" strike="sngStrike" dirty="0"/>
           </a:p>
           <a:p>
             <a:pPr marL="342900" indent="-342900" algn="just">
@@ -16302,7 +16327,7 @@
               <a:buChar char="•"/>
             </a:pPr>
             <a:r>
-              <a:rPr lang="en-US" sz="2400" dirty="0"/>
+              <a:rPr lang="en-US" sz="1800" strike="sngStrike" dirty="0"/>
               <a:t>Design the architecture and implementation of an application that fulfills a set of functional requirements, user interface requirements, and addresses business models effectively.</a:t>
             </a:r>
           </a:p>
@@ -16312,10 +16337,10 @@
               <a:buChar char="•"/>
             </a:pPr>
             <a:r>
-              <a:rPr lang="en-US" sz="2400" dirty="0"/>
+              <a:rPr lang="en-US" sz="1800" strike="sngStrike" dirty="0"/>
               <a:t>Recognize that Domain-Driven Design presents technical challenges but also provides opportunities, especially when dealing with legacy software projects that have become difficult to maintain.</a:t>
             </a:r>
-            <a:endParaRPr lang="pt-BR" sz="2400" dirty="0"/>
+            <a:endParaRPr lang="pt-BR" sz="1800" strike="sngStrike" dirty="0"/>
           </a:p>
           <a:p>
             <a:pPr marL="342900" indent="-342900" algn="just">
@@ -16361,8 +16386,8 @@
         </p:blipFill>
         <p:spPr bwMode="auto">
           <a:xfrm>
-            <a:off x="8915977" y="1025525"/>
-            <a:ext cx="2857500" cy="1600200"/>
+            <a:off x="10371909" y="304008"/>
+            <a:ext cx="1641054" cy="918990"/>
           </a:xfrm>
           <a:prstGeom prst="rect">
             <a:avLst/>
@@ -16379,6 +16404,227 @@
           </a:extLst>
         </p:spPr>
       </p:pic>
+      <p:sp>
+        <p:nvSpPr>
+          <p:cNvPr id="7" name="CaixaDeTexto 6">
+            <a:extLst>
+              <a:ext uri="{FF2B5EF4-FFF2-40B4-BE49-F238E27FC236}">
+                <a16:creationId xmlns:a16="http://schemas.microsoft.com/office/drawing/2014/main" id="{33BFFE43-CAF6-ED28-A077-6DD261B4DAC8}"/>
+              </a:ext>
+            </a:extLst>
+          </p:cNvPr>
+          <p:cNvSpPr txBox="1"/>
+          <p:nvPr/>
+        </p:nvSpPr>
+        <p:spPr>
+          <a:xfrm>
+            <a:off x="5733029" y="1712384"/>
+            <a:ext cx="5858691" cy="4616648"/>
+          </a:xfrm>
+          <a:prstGeom prst="rect">
+            <a:avLst/>
+          </a:prstGeom>
+          <a:noFill/>
+        </p:spPr>
+        <p:txBody>
+          <a:bodyPr wrap="square">
+            <a:spAutoFit/>
+          </a:bodyPr>
+          <a:lstStyle/>
+          <a:p>
+            <a:pPr>
+              <a:buNone/>
+            </a:pPr>
+            <a:r>
+              <a:rPr lang="en-US" sz="1400" dirty="0"/>
+              <a:t>✅ Understand that software development is an </a:t>
+            </a:r>
+            <a:r>
+              <a:rPr lang="en-US" sz="1400" b="1" dirty="0"/>
+              <a:t>iterative process</a:t>
+            </a:r>
+            <a:r>
+              <a:rPr lang="en-US" sz="1400" dirty="0"/>
+              <a:t> requiring continuous architectural decisions.</a:t>
+            </a:r>
+          </a:p>
+          <a:p>
+            <a:pPr>
+              <a:buNone/>
+            </a:pPr>
+            <a:r>
+              <a:rPr lang="en-US" sz="1400" dirty="0"/>
+              <a:t>✅ Recognize the importance of </a:t>
+            </a:r>
+            <a:r>
+              <a:rPr lang="en-US" sz="1400" b="1" dirty="0"/>
+              <a:t>collaboration</a:t>
+            </a:r>
+            <a:r>
+              <a:rPr lang="en-US" sz="1400" dirty="0"/>
+              <a:t> between developers, architects, and domain experts to align technical solutions with business goals.</a:t>
+            </a:r>
+          </a:p>
+          <a:p>
+            <a:pPr>
+              <a:buNone/>
+            </a:pPr>
+            <a:r>
+              <a:rPr lang="en-US" sz="1400" dirty="0"/>
+              <a:t>✅ Design application architecture using key </a:t>
+            </a:r>
+            <a:r>
+              <a:rPr lang="en-US" sz="1400" b="1" dirty="0"/>
+              <a:t>architectural patterns</a:t>
+            </a:r>
+            <a:r>
+              <a:rPr lang="en-US" sz="1400" dirty="0"/>
+              <a:t> such as:</a:t>
+            </a:r>
+          </a:p>
+          <a:p>
+            <a:pPr>
+              <a:buFont typeface="Arial" panose="020B0604020202020204" pitchFamily="34" charset="0"/>
+              <a:buChar char="•"/>
+            </a:pPr>
+            <a:r>
+              <a:rPr lang="en-US" sz="1400" b="1" dirty="0"/>
+              <a:t>Layered Architecture</a:t>
+            </a:r>
+            <a:endParaRPr lang="en-US" sz="1400" dirty="0"/>
+          </a:p>
+          <a:p>
+            <a:pPr>
+              <a:buFont typeface="Arial" panose="020B0604020202020204" pitchFamily="34" charset="0"/>
+              <a:buChar char="•"/>
+            </a:pPr>
+            <a:r>
+              <a:rPr lang="en-US" sz="1400" b="1" dirty="0"/>
+              <a:t>Model-View-Controller (MVC)</a:t>
+            </a:r>
+            <a:endParaRPr lang="en-US" sz="1400" dirty="0"/>
+          </a:p>
+          <a:p>
+            <a:pPr>
+              <a:buFont typeface="Arial" panose="020B0604020202020204" pitchFamily="34" charset="0"/>
+              <a:buChar char="•"/>
+            </a:pPr>
+            <a:r>
+              <a:rPr lang="en-US" sz="1400" b="1" dirty="0"/>
+              <a:t>Command Query Responsibility Segregation (CQRS)</a:t>
+            </a:r>
+            <a:endParaRPr lang="en-US" sz="1400" dirty="0"/>
+          </a:p>
+          <a:p>
+            <a:pPr>
+              <a:buFont typeface="Arial" panose="020B0604020202020204" pitchFamily="34" charset="0"/>
+              <a:buChar char="•"/>
+            </a:pPr>
+            <a:r>
+              <a:rPr lang="en-US" sz="1400" b="1" dirty="0"/>
+              <a:t>Event-Driven Architecture</a:t>
+            </a:r>
+            <a:endParaRPr lang="en-US" sz="1400" dirty="0"/>
+          </a:p>
+          <a:p>
+            <a:pPr>
+              <a:buNone/>
+            </a:pPr>
+            <a:r>
+              <a:rPr lang="en-US" sz="1400" dirty="0"/>
+              <a:t>✅ Apply fundamental </a:t>
+            </a:r>
+            <a:r>
+              <a:rPr lang="en-US" sz="1400" b="1" dirty="0"/>
+              <a:t>design patterns</a:t>
+            </a:r>
+            <a:r>
+              <a:rPr lang="en-US" sz="1400" dirty="0"/>
+              <a:t> to build scalable and maintainable solutions, including:</a:t>
+            </a:r>
+          </a:p>
+          <a:p>
+            <a:pPr>
+              <a:buFont typeface="Arial" panose="020B0604020202020204" pitchFamily="34" charset="0"/>
+              <a:buChar char="•"/>
+            </a:pPr>
+            <a:r>
+              <a:rPr lang="en-US" sz="1400" b="1" dirty="0"/>
+              <a:t>Factory Method</a:t>
+            </a:r>
+            <a:endParaRPr lang="en-US" sz="1400" dirty="0"/>
+          </a:p>
+          <a:p>
+            <a:pPr>
+              <a:buFont typeface="Arial" panose="020B0604020202020204" pitchFamily="34" charset="0"/>
+              <a:buChar char="•"/>
+            </a:pPr>
+            <a:r>
+              <a:rPr lang="en-US" sz="1400" b="1" dirty="0"/>
+              <a:t>Strategy</a:t>
+            </a:r>
+            <a:endParaRPr lang="en-US" sz="1400" dirty="0"/>
+          </a:p>
+          <a:p>
+            <a:pPr>
+              <a:buFont typeface="Arial" panose="020B0604020202020204" pitchFamily="34" charset="0"/>
+              <a:buChar char="•"/>
+            </a:pPr>
+            <a:r>
+              <a:rPr lang="en-US" sz="1400" b="1" dirty="0"/>
+              <a:t>Adapter</a:t>
+            </a:r>
+            <a:endParaRPr lang="en-US" sz="1400" dirty="0"/>
+          </a:p>
+          <a:p>
+            <a:pPr>
+              <a:buFont typeface="Arial" panose="020B0604020202020204" pitchFamily="34" charset="0"/>
+              <a:buChar char="•"/>
+            </a:pPr>
+            <a:r>
+              <a:rPr lang="en-US" sz="1400" b="1" dirty="0"/>
+              <a:t>Decorator</a:t>
+            </a:r>
+            <a:endParaRPr lang="en-US" sz="1400" dirty="0"/>
+          </a:p>
+          <a:p>
+            <a:pPr>
+              <a:buFont typeface="Arial" panose="020B0604020202020204" pitchFamily="34" charset="0"/>
+              <a:buChar char="•"/>
+            </a:pPr>
+            <a:r>
+              <a:rPr lang="en-US" sz="1400" b="1" dirty="0"/>
+              <a:t>Repository</a:t>
+            </a:r>
+            <a:endParaRPr lang="en-US" sz="1400" dirty="0"/>
+          </a:p>
+          <a:p>
+            <a:pPr>
+              <a:buFont typeface="Arial" panose="020B0604020202020204" pitchFamily="34" charset="0"/>
+              <a:buChar char="•"/>
+            </a:pPr>
+            <a:r>
+              <a:rPr lang="en-US" sz="1400" b="1" dirty="0"/>
+              <a:t>Unit of Work</a:t>
+            </a:r>
+            <a:endParaRPr lang="en-US" sz="1400" dirty="0"/>
+          </a:p>
+          <a:p>
+            <a:r>
+              <a:rPr lang="en-US" sz="1400" dirty="0"/>
+              <a:t>✅ Analyze how design and architectural patterns help modernize and manage </a:t>
+            </a:r>
+            <a:r>
+              <a:rPr lang="en-US" sz="1400" b="1" dirty="0"/>
+              <a:t>legacy systems</a:t>
+            </a:r>
+            <a:r>
+              <a:rPr lang="en-US" sz="1400" dirty="0"/>
+              <a:t>, improving maintainability and reducing technical debt.</a:t>
+            </a:r>
+          </a:p>
+        </p:txBody>
+      </p:sp>
     </p:spTree>
     <p:extLst>
       <p:ext uri="{BB962C8B-B14F-4D97-AF65-F5344CB8AC3E}">

</xml_diff>